<commit_message>
add chinese version of pin map
</commit_message>
<xml_diff>
--- a/img/pin_map.pptx
+++ b/img/pin_map.pptx
@@ -8,6 +8,7 @@
     <p:sldId id="260" r:id="rId2"/>
     <p:sldId id="257" r:id="rId3"/>
     <p:sldId id="261" r:id="rId4"/>
+    <p:sldId id="263" r:id="rId5"/>
   </p:sldIdLst>
   <p:sldSz cx="12192000" cy="6858000"/>
   <p:notesSz cx="6858000" cy="9144000"/>
@@ -275,7 +276,7 @@
           <a:p>
             <a:fld id="{6BAEC7DB-416E-4648-AE31-15D6F0A9A9FB}" type="datetimeFigureOut">
               <a:rPr lang="en-US" smtClean="0"/>
-              <a:t>9/10/2018</a:t>
+              <a:t>9/27/2018</a:t>
             </a:fld>
             <a:endParaRPr lang="en-US"/>
           </a:p>
@@ -475,7 +476,7 @@
           <a:p>
             <a:fld id="{6BAEC7DB-416E-4648-AE31-15D6F0A9A9FB}" type="datetimeFigureOut">
               <a:rPr lang="en-US" smtClean="0"/>
-              <a:t>9/10/2018</a:t>
+              <a:t>9/27/2018</a:t>
             </a:fld>
             <a:endParaRPr lang="en-US"/>
           </a:p>
@@ -685,7 +686,7 @@
           <a:p>
             <a:fld id="{6BAEC7DB-416E-4648-AE31-15D6F0A9A9FB}" type="datetimeFigureOut">
               <a:rPr lang="en-US" smtClean="0"/>
-              <a:t>9/10/2018</a:t>
+              <a:t>9/27/2018</a:t>
             </a:fld>
             <a:endParaRPr lang="en-US"/>
           </a:p>
@@ -885,7 +886,7 @@
           <a:p>
             <a:fld id="{6BAEC7DB-416E-4648-AE31-15D6F0A9A9FB}" type="datetimeFigureOut">
               <a:rPr lang="en-US" smtClean="0"/>
-              <a:t>9/10/2018</a:t>
+              <a:t>9/27/2018</a:t>
             </a:fld>
             <a:endParaRPr lang="en-US"/>
           </a:p>
@@ -1161,7 +1162,7 @@
           <a:p>
             <a:fld id="{6BAEC7DB-416E-4648-AE31-15D6F0A9A9FB}" type="datetimeFigureOut">
               <a:rPr lang="en-US" smtClean="0"/>
-              <a:t>9/10/2018</a:t>
+              <a:t>9/27/2018</a:t>
             </a:fld>
             <a:endParaRPr lang="en-US"/>
           </a:p>
@@ -1429,7 +1430,7 @@
           <a:p>
             <a:fld id="{6BAEC7DB-416E-4648-AE31-15D6F0A9A9FB}" type="datetimeFigureOut">
               <a:rPr lang="en-US" smtClean="0"/>
-              <a:t>9/10/2018</a:t>
+              <a:t>9/27/2018</a:t>
             </a:fld>
             <a:endParaRPr lang="en-US"/>
           </a:p>
@@ -1844,7 +1845,7 @@
           <a:p>
             <a:fld id="{6BAEC7DB-416E-4648-AE31-15D6F0A9A9FB}" type="datetimeFigureOut">
               <a:rPr lang="en-US" smtClean="0"/>
-              <a:t>9/10/2018</a:t>
+              <a:t>9/27/2018</a:t>
             </a:fld>
             <a:endParaRPr lang="en-US"/>
           </a:p>
@@ -1986,7 +1987,7 @@
           <a:p>
             <a:fld id="{6BAEC7DB-416E-4648-AE31-15D6F0A9A9FB}" type="datetimeFigureOut">
               <a:rPr lang="en-US" smtClean="0"/>
-              <a:t>9/10/2018</a:t>
+              <a:t>9/27/2018</a:t>
             </a:fld>
             <a:endParaRPr lang="en-US"/>
           </a:p>
@@ -2099,7 +2100,7 @@
           <a:p>
             <a:fld id="{6BAEC7DB-416E-4648-AE31-15D6F0A9A9FB}" type="datetimeFigureOut">
               <a:rPr lang="en-US" smtClean="0"/>
-              <a:t>9/10/2018</a:t>
+              <a:t>9/27/2018</a:t>
             </a:fld>
             <a:endParaRPr lang="en-US"/>
           </a:p>
@@ -2412,7 +2413,7 @@
           <a:p>
             <a:fld id="{6BAEC7DB-416E-4648-AE31-15D6F0A9A9FB}" type="datetimeFigureOut">
               <a:rPr lang="en-US" smtClean="0"/>
-              <a:t>9/10/2018</a:t>
+              <a:t>9/27/2018</a:t>
             </a:fld>
             <a:endParaRPr lang="en-US"/>
           </a:p>
@@ -2701,7 +2702,7 @@
           <a:p>
             <a:fld id="{6BAEC7DB-416E-4648-AE31-15D6F0A9A9FB}" type="datetimeFigureOut">
               <a:rPr lang="en-US" smtClean="0"/>
-              <a:t>9/10/2018</a:t>
+              <a:t>9/27/2018</a:t>
             </a:fld>
             <a:endParaRPr lang="en-US"/>
           </a:p>
@@ -2944,7 +2945,7 @@
           <a:p>
             <a:fld id="{6BAEC7DB-416E-4648-AE31-15D6F0A9A9FB}" type="datetimeFigureOut">
               <a:rPr lang="en-US" smtClean="0"/>
-              <a:t>9/10/2018</a:t>
+              <a:t>9/27/2018</a:t>
             </a:fld>
             <a:endParaRPr lang="en-US"/>
           </a:p>
@@ -5990,6 +5991,2169 @@
 </p:sld>
 </file>
 
+<file path=ppt/slides/slide4.xml><?xml version="1.0" encoding="utf-8"?>
+<p:sld xmlns:a="http://schemas.openxmlformats.org/drawingml/2006/main" xmlns:r="http://schemas.openxmlformats.org/officeDocument/2006/relationships" xmlns:p="http://schemas.openxmlformats.org/presentationml/2006/main">
+  <p:cSld>
+    <p:spTree>
+      <p:nvGrpSpPr>
+        <p:cNvPr id="1" name=""/>
+        <p:cNvGrpSpPr/>
+        <p:nvPr/>
+      </p:nvGrpSpPr>
+      <p:grpSpPr>
+        <a:xfrm>
+          <a:off x="0" y="0"/>
+          <a:ext cx="0" cy="0"/>
+          <a:chOff x="0" y="0"/>
+          <a:chExt cx="0" cy="0"/>
+        </a:xfrm>
+      </p:grpSpPr>
+      <p:pic>
+        <p:nvPicPr>
+          <p:cNvPr id="6" name="图片 5">
+            <a:extLst>
+              <a:ext uri="{FF2B5EF4-FFF2-40B4-BE49-F238E27FC236}">
+                <a16:creationId xmlns:a16="http://schemas.microsoft.com/office/drawing/2014/main" id="{446B059E-C92C-4F63-88F8-D5B0529BF3B0}"/>
+              </a:ext>
+            </a:extLst>
+          </p:cNvPr>
+          <p:cNvPicPr>
+            <a:picLocks noChangeAspect="1"/>
+          </p:cNvPicPr>
+          <p:nvPr/>
+        </p:nvPicPr>
+        <p:blipFill>
+          <a:blip r:embed="rId2">
+            <a:extLst>
+              <a:ext uri="{28A0092B-C50C-407E-A947-70E740481C1C}">
+                <a14:useLocalDpi xmlns:a14="http://schemas.microsoft.com/office/drawing/2010/main" val="0"/>
+              </a:ext>
+            </a:extLst>
+          </a:blip>
+          <a:stretch>
+            <a:fillRect/>
+          </a:stretch>
+        </p:blipFill>
+        <p:spPr>
+          <a:xfrm>
+            <a:off x="3054915" y="544477"/>
+            <a:ext cx="4808166" cy="3606125"/>
+          </a:xfrm>
+          <a:prstGeom prst="rect">
+            <a:avLst/>
+          </a:prstGeom>
+        </p:spPr>
+      </p:pic>
+      <p:grpSp>
+        <p:nvGrpSpPr>
+          <p:cNvPr id="8" name="组合 7">
+            <a:extLst>
+              <a:ext uri="{FF2B5EF4-FFF2-40B4-BE49-F238E27FC236}">
+                <a16:creationId xmlns:a16="http://schemas.microsoft.com/office/drawing/2014/main" id="{6218722A-0696-4AF6-A2C0-F16849BF939C}"/>
+              </a:ext>
+            </a:extLst>
+          </p:cNvPr>
+          <p:cNvGrpSpPr/>
+          <p:nvPr/>
+        </p:nvGrpSpPr>
+        <p:grpSpPr>
+          <a:xfrm>
+            <a:off x="2965090" y="2122111"/>
+            <a:ext cx="677045" cy="608702"/>
+            <a:chOff x="3523772" y="1942051"/>
+            <a:chExt cx="914400" cy="483249"/>
+          </a:xfrm>
+        </p:grpSpPr>
+        <p:cxnSp>
+          <p:nvCxnSpPr>
+            <p:cNvPr id="59" name="直接连接符 58">
+              <a:extLst>
+                <a:ext uri="{FF2B5EF4-FFF2-40B4-BE49-F238E27FC236}">
+                  <a16:creationId xmlns:a16="http://schemas.microsoft.com/office/drawing/2014/main" id="{554D8D14-D48D-45F6-89A6-634C964B8AE8}"/>
+                </a:ext>
+              </a:extLst>
+            </p:cNvPr>
+            <p:cNvCxnSpPr>
+              <a:cxnSpLocks/>
+            </p:cNvCxnSpPr>
+            <p:nvPr/>
+          </p:nvCxnSpPr>
+          <p:spPr>
+            <a:xfrm>
+              <a:off x="3523772" y="1942051"/>
+              <a:ext cx="914400" cy="0"/>
+            </a:xfrm>
+            <a:prstGeom prst="line">
+              <a:avLst/>
+            </a:prstGeom>
+            <a:ln w="12700" cap="flat" cmpd="sng" algn="ctr">
+              <a:solidFill>
+                <a:schemeClr val="accent3"/>
+              </a:solidFill>
+              <a:prstDash val="dash"/>
+              <a:round/>
+              <a:headEnd type="none" w="med" len="med"/>
+              <a:tailEnd type="none" w="med" len="med"/>
+            </a:ln>
+          </p:spPr>
+          <p:style>
+            <a:lnRef idx="0">
+              <a:scrgbClr r="0" g="0" b="0"/>
+            </a:lnRef>
+            <a:fillRef idx="0">
+              <a:scrgbClr r="0" g="0" b="0"/>
+            </a:fillRef>
+            <a:effectRef idx="0">
+              <a:scrgbClr r="0" g="0" b="0"/>
+            </a:effectRef>
+            <a:fontRef idx="minor">
+              <a:schemeClr val="tx1"/>
+            </a:fontRef>
+          </p:style>
+        </p:cxnSp>
+        <p:cxnSp>
+          <p:nvCxnSpPr>
+            <p:cNvPr id="62" name="直接连接符 61">
+              <a:extLst>
+                <a:ext uri="{FF2B5EF4-FFF2-40B4-BE49-F238E27FC236}">
+                  <a16:creationId xmlns:a16="http://schemas.microsoft.com/office/drawing/2014/main" id="{71513585-2402-4773-B202-B5A94B9B4E68}"/>
+                </a:ext>
+              </a:extLst>
+            </p:cNvPr>
+            <p:cNvCxnSpPr>
+              <a:cxnSpLocks/>
+            </p:cNvCxnSpPr>
+            <p:nvPr/>
+          </p:nvCxnSpPr>
+          <p:spPr>
+            <a:xfrm>
+              <a:off x="3523772" y="2425300"/>
+              <a:ext cx="914400" cy="0"/>
+            </a:xfrm>
+            <a:prstGeom prst="line">
+              <a:avLst/>
+            </a:prstGeom>
+            <a:ln w="12700" cap="flat" cmpd="sng" algn="ctr">
+              <a:solidFill>
+                <a:schemeClr val="accent3"/>
+              </a:solidFill>
+              <a:prstDash val="dash"/>
+              <a:round/>
+              <a:headEnd type="none" w="med" len="med"/>
+              <a:tailEnd type="none" w="med" len="med"/>
+            </a:ln>
+          </p:spPr>
+          <p:style>
+            <a:lnRef idx="0">
+              <a:scrgbClr r="0" g="0" b="0"/>
+            </a:lnRef>
+            <a:fillRef idx="0">
+              <a:scrgbClr r="0" g="0" b="0"/>
+            </a:fillRef>
+            <a:effectRef idx="0">
+              <a:scrgbClr r="0" g="0" b="0"/>
+            </a:effectRef>
+            <a:fontRef idx="minor">
+              <a:schemeClr val="tx1"/>
+            </a:fontRef>
+          </p:style>
+        </p:cxnSp>
+        <p:cxnSp>
+          <p:nvCxnSpPr>
+            <p:cNvPr id="64" name="直接连接符 63">
+              <a:extLst>
+                <a:ext uri="{FF2B5EF4-FFF2-40B4-BE49-F238E27FC236}">
+                  <a16:creationId xmlns:a16="http://schemas.microsoft.com/office/drawing/2014/main" id="{F11B205F-0707-4A55-ACA4-3B1022C2AD5E}"/>
+                </a:ext>
+              </a:extLst>
+            </p:cNvPr>
+            <p:cNvCxnSpPr>
+              <a:cxnSpLocks/>
+            </p:cNvCxnSpPr>
+            <p:nvPr/>
+          </p:nvCxnSpPr>
+          <p:spPr>
+            <a:xfrm>
+              <a:off x="3523772" y="2267985"/>
+              <a:ext cx="914400" cy="0"/>
+            </a:xfrm>
+            <a:prstGeom prst="line">
+              <a:avLst/>
+            </a:prstGeom>
+            <a:ln w="12700" cap="flat" cmpd="sng" algn="ctr">
+              <a:solidFill>
+                <a:schemeClr val="accent3"/>
+              </a:solidFill>
+              <a:prstDash val="dash"/>
+              <a:round/>
+              <a:headEnd type="none" w="med" len="med"/>
+              <a:tailEnd type="none" w="med" len="med"/>
+            </a:ln>
+          </p:spPr>
+          <p:style>
+            <a:lnRef idx="0">
+              <a:scrgbClr r="0" g="0" b="0"/>
+            </a:lnRef>
+            <a:fillRef idx="0">
+              <a:scrgbClr r="0" g="0" b="0"/>
+            </a:fillRef>
+            <a:effectRef idx="0">
+              <a:scrgbClr r="0" g="0" b="0"/>
+            </a:effectRef>
+            <a:fontRef idx="minor">
+              <a:schemeClr val="tx1"/>
+            </a:fontRef>
+          </p:style>
+        </p:cxnSp>
+        <p:cxnSp>
+          <p:nvCxnSpPr>
+            <p:cNvPr id="69" name="直接连接符 68">
+              <a:extLst>
+                <a:ext uri="{FF2B5EF4-FFF2-40B4-BE49-F238E27FC236}">
+                  <a16:creationId xmlns:a16="http://schemas.microsoft.com/office/drawing/2014/main" id="{C23963EC-181B-4C8C-91B5-30994438B94F}"/>
+                </a:ext>
+              </a:extLst>
+            </p:cNvPr>
+            <p:cNvCxnSpPr>
+              <a:cxnSpLocks/>
+            </p:cNvCxnSpPr>
+            <p:nvPr/>
+          </p:nvCxnSpPr>
+          <p:spPr>
+            <a:xfrm>
+              <a:off x="3523772" y="2103753"/>
+              <a:ext cx="914400" cy="0"/>
+            </a:xfrm>
+            <a:prstGeom prst="line">
+              <a:avLst/>
+            </a:prstGeom>
+            <a:ln w="12700" cap="flat" cmpd="sng" algn="ctr">
+              <a:solidFill>
+                <a:schemeClr val="accent3"/>
+              </a:solidFill>
+              <a:prstDash val="dash"/>
+              <a:round/>
+              <a:headEnd type="none" w="med" len="med"/>
+              <a:tailEnd type="none" w="med" len="med"/>
+            </a:ln>
+          </p:spPr>
+          <p:style>
+            <a:lnRef idx="0">
+              <a:scrgbClr r="0" g="0" b="0"/>
+            </a:lnRef>
+            <a:fillRef idx="0">
+              <a:scrgbClr r="0" g="0" b="0"/>
+            </a:fillRef>
+            <a:effectRef idx="0">
+              <a:scrgbClr r="0" g="0" b="0"/>
+            </a:effectRef>
+            <a:fontRef idx="minor">
+              <a:schemeClr val="tx1"/>
+            </a:fontRef>
+          </p:style>
+        </p:cxnSp>
+      </p:grpSp>
+      <p:cxnSp>
+        <p:nvCxnSpPr>
+          <p:cNvPr id="83" name="直接连接符 82">
+            <a:extLst>
+              <a:ext uri="{FF2B5EF4-FFF2-40B4-BE49-F238E27FC236}">
+                <a16:creationId xmlns:a16="http://schemas.microsoft.com/office/drawing/2014/main" id="{2B1DA2A3-4ED3-4440-94B7-BBD22FB36479}"/>
+              </a:ext>
+            </a:extLst>
+          </p:cNvPr>
+          <p:cNvCxnSpPr>
+            <a:cxnSpLocks/>
+            <a:endCxn id="51" idx="3"/>
+          </p:cNvCxnSpPr>
+          <p:nvPr/>
+        </p:nvCxnSpPr>
+        <p:spPr>
+          <a:xfrm flipH="1" flipV="1">
+            <a:off x="2612548" y="1725073"/>
+            <a:ext cx="348812" cy="397038"/>
+          </a:xfrm>
+          <a:prstGeom prst="line">
+            <a:avLst/>
+          </a:prstGeom>
+          <a:ln w="12700" cap="flat" cmpd="sng" algn="ctr">
+            <a:solidFill>
+              <a:schemeClr val="accent3"/>
+            </a:solidFill>
+            <a:prstDash val="dash"/>
+            <a:round/>
+            <a:headEnd type="none" w="med" len="med"/>
+            <a:tailEnd type="none" w="med" len="med"/>
+          </a:ln>
+        </p:spPr>
+        <p:style>
+          <a:lnRef idx="0">
+            <a:scrgbClr r="0" g="0" b="0"/>
+          </a:lnRef>
+          <a:fillRef idx="0">
+            <a:scrgbClr r="0" g="0" b="0"/>
+          </a:fillRef>
+          <a:effectRef idx="0">
+            <a:scrgbClr r="0" g="0" b="0"/>
+          </a:effectRef>
+          <a:fontRef idx="minor">
+            <a:schemeClr val="tx1"/>
+          </a:fontRef>
+        </p:style>
+      </p:cxnSp>
+      <p:cxnSp>
+        <p:nvCxnSpPr>
+          <p:cNvPr id="86" name="直接连接符 85">
+            <a:extLst>
+              <a:ext uri="{FF2B5EF4-FFF2-40B4-BE49-F238E27FC236}">
+                <a16:creationId xmlns:a16="http://schemas.microsoft.com/office/drawing/2014/main" id="{1DDB23F1-BC13-4F76-9BE4-AB93E1600A98}"/>
+              </a:ext>
+            </a:extLst>
+          </p:cNvPr>
+          <p:cNvCxnSpPr>
+            <a:cxnSpLocks/>
+            <a:endCxn id="53" idx="3"/>
+          </p:cNvCxnSpPr>
+          <p:nvPr/>
+        </p:nvCxnSpPr>
+        <p:spPr>
+          <a:xfrm flipH="1">
+            <a:off x="2612548" y="2730509"/>
+            <a:ext cx="348811" cy="404740"/>
+          </a:xfrm>
+          <a:prstGeom prst="line">
+            <a:avLst/>
+          </a:prstGeom>
+          <a:ln w="12700" cap="flat" cmpd="sng" algn="ctr">
+            <a:solidFill>
+              <a:schemeClr val="accent3"/>
+            </a:solidFill>
+            <a:prstDash val="dash"/>
+            <a:round/>
+            <a:headEnd type="none" w="med" len="med"/>
+            <a:tailEnd type="none" w="med" len="med"/>
+          </a:ln>
+        </p:spPr>
+        <p:style>
+          <a:lnRef idx="0">
+            <a:scrgbClr r="0" g="0" b="0"/>
+          </a:lnRef>
+          <a:fillRef idx="0">
+            <a:scrgbClr r="0" g="0" b="0"/>
+          </a:fillRef>
+          <a:effectRef idx="0">
+            <a:scrgbClr r="0" g="0" b="0"/>
+          </a:effectRef>
+          <a:fontRef idx="minor">
+            <a:schemeClr val="tx1"/>
+          </a:fontRef>
+        </p:style>
+      </p:cxnSp>
+      <p:sp>
+        <p:nvSpPr>
+          <p:cNvPr id="5" name="文本框 4">
+            <a:extLst>
+              <a:ext uri="{FF2B5EF4-FFF2-40B4-BE49-F238E27FC236}">
+                <a16:creationId xmlns:a16="http://schemas.microsoft.com/office/drawing/2014/main" id="{D01C0A0C-C039-423C-A515-A9BDBADCF5E6}"/>
+              </a:ext>
+            </a:extLst>
+          </p:cNvPr>
+          <p:cNvSpPr txBox="1"/>
+          <p:nvPr/>
+        </p:nvSpPr>
+        <p:spPr>
+          <a:xfrm>
+            <a:off x="2967546" y="4311659"/>
+            <a:ext cx="8010353" cy="2205732"/>
+          </a:xfrm>
+          <a:prstGeom prst="rect">
+            <a:avLst/>
+          </a:prstGeom>
+          <a:noFill/>
+        </p:spPr>
+        <p:txBody>
+          <a:bodyPr wrap="square" rtlCol="0">
+            <a:spAutoFit/>
+          </a:bodyPr>
+          <a:lstStyle/>
+          <a:p>
+            <a:pPr>
+              <a:lnSpc>
+                <a:spcPts val="2500"/>
+              </a:lnSpc>
+            </a:pPr>
+            <a:r>
+              <a:rPr lang="en-US" sz="1600">
+                <a:latin typeface="Leelawadee UI" panose="020B0502040204020203" pitchFamily="34" charset="-34"/>
+                <a:ea typeface="Microsoft JhengHei Light" panose="020B0304030504040204" pitchFamily="34" charset="-120"/>
+                <a:cs typeface="Leelawadee UI" panose="020B0502040204020203" pitchFamily="34" charset="-34"/>
+              </a:rPr>
+              <a:t>GND: </a:t>
+            </a:r>
+            <a:r>
+              <a:rPr lang="zh-CN" altLang="en-US" sz="1600">
+                <a:latin typeface="华文楷体" panose="02010600040101010101" pitchFamily="2" charset="-122"/>
+                <a:ea typeface="华文楷体" panose="02010600040101010101" pitchFamily="2" charset="-122"/>
+                <a:cs typeface="Leelawadee UI" panose="020B0502040204020203" pitchFamily="34" charset="-34"/>
+              </a:rPr>
+              <a:t>将此模块的</a:t>
+            </a:r>
+            <a:r>
+              <a:rPr lang="zh-CN" altLang="en-US" sz="1600">
+                <a:latin typeface="Leelawadee UI" panose="020B0502040204020203" pitchFamily="34" charset="-34"/>
+                <a:ea typeface="Microsoft JhengHei Light" panose="020B0304030504040204" pitchFamily="34" charset="-120"/>
+                <a:cs typeface="Leelawadee UI" panose="020B0502040204020203" pitchFamily="34" charset="-34"/>
+              </a:rPr>
+              <a:t> </a:t>
+            </a:r>
+            <a:r>
+              <a:rPr lang="en-US" altLang="zh-CN" sz="1600">
+                <a:latin typeface="Leelawadee UI" panose="020B0502040204020203" pitchFamily="34" charset="-34"/>
+                <a:ea typeface="Microsoft JhengHei Light" panose="020B0304030504040204" pitchFamily="34" charset="-120"/>
+                <a:cs typeface="Leelawadee UI" panose="020B0502040204020203" pitchFamily="34" charset="-34"/>
+              </a:rPr>
+              <a:t>GND </a:t>
+            </a:r>
+            <a:r>
+              <a:rPr lang="zh-CN" altLang="en-US" sz="1600">
+                <a:latin typeface="华文楷体" panose="02010600040101010101" pitchFamily="2" charset="-122"/>
+                <a:ea typeface="华文楷体" panose="02010600040101010101" pitchFamily="2" charset="-122"/>
+                <a:cs typeface="Leelawadee UI" panose="020B0502040204020203" pitchFamily="34" charset="-34"/>
+              </a:rPr>
+              <a:t>连接到系统的 </a:t>
+            </a:r>
+            <a:r>
+              <a:rPr lang="en-US" altLang="zh-CN" sz="1600">
+                <a:latin typeface="Leelawadee UI" panose="020B0502040204020203" pitchFamily="34" charset="-34"/>
+                <a:ea typeface="Microsoft JhengHei Light" panose="020B0304030504040204" pitchFamily="34" charset="-120"/>
+                <a:cs typeface="Leelawadee UI" panose="020B0502040204020203" pitchFamily="34" charset="-34"/>
+              </a:rPr>
+              <a:t>GND </a:t>
+            </a:r>
+            <a:r>
+              <a:rPr lang="zh-CN" altLang="en-US" sz="1600">
+                <a:latin typeface="华文楷体" panose="02010600040101010101" pitchFamily="2" charset="-122"/>
+                <a:ea typeface="华文楷体" panose="02010600040101010101" pitchFamily="2" charset="-122"/>
+                <a:cs typeface="Leelawadee UI" panose="020B0502040204020203" pitchFamily="34" charset="-34"/>
+              </a:rPr>
+              <a:t>上</a:t>
+            </a:r>
+            <a:endParaRPr lang="en-US" sz="1600">
+              <a:latin typeface="华文楷体" panose="02010600040101010101" pitchFamily="2" charset="-122"/>
+              <a:ea typeface="华文楷体" panose="02010600040101010101" pitchFamily="2" charset="-122"/>
+              <a:cs typeface="Leelawadee UI" panose="020B0502040204020203" pitchFamily="34" charset="-34"/>
+            </a:endParaRPr>
+          </a:p>
+          <a:p>
+            <a:pPr>
+              <a:lnSpc>
+                <a:spcPts val="2500"/>
+              </a:lnSpc>
+            </a:pPr>
+            <a:r>
+              <a:rPr lang="en-US" sz="1600">
+                <a:latin typeface="Leelawadee UI" panose="020B0502040204020203" pitchFamily="34" charset="-34"/>
+                <a:ea typeface="Microsoft JhengHei Light" panose="020B0304030504040204" pitchFamily="34" charset="-120"/>
+                <a:cs typeface="Leelawadee UI" panose="020B0502040204020203" pitchFamily="34" charset="-34"/>
+              </a:rPr>
+              <a:t>VCC: </a:t>
+            </a:r>
+            <a:r>
+              <a:rPr lang="zh-CN" altLang="en-US" sz="1600">
+                <a:latin typeface="华文楷体" panose="02010600040101010101" pitchFamily="2" charset="-122"/>
+                <a:ea typeface="华文楷体" panose="02010600040101010101" pitchFamily="2" charset="-122"/>
+                <a:cs typeface="Leelawadee UI" panose="020B0502040204020203" pitchFamily="34" charset="-34"/>
+              </a:rPr>
+              <a:t>您可使用 </a:t>
+            </a:r>
+            <a:r>
+              <a:rPr lang="en-US" sz="1600">
+                <a:latin typeface="Leelawadee UI" panose="020B0502040204020203" pitchFamily="34" charset="-34"/>
+                <a:ea typeface="Microsoft JhengHei Light" panose="020B0304030504040204" pitchFamily="34" charset="-120"/>
+                <a:cs typeface="Leelawadee UI" panose="020B0502040204020203" pitchFamily="34" charset="-34"/>
+              </a:rPr>
+              <a:t>5V </a:t>
+            </a:r>
+            <a:r>
+              <a:rPr lang="zh-CN" altLang="en-US" sz="1600">
+                <a:latin typeface="华文楷体" panose="02010600040101010101" pitchFamily="2" charset="-122"/>
+                <a:ea typeface="华文楷体" panose="02010600040101010101" pitchFamily="2" charset="-122"/>
+                <a:cs typeface="Leelawadee UI" panose="020B0502040204020203" pitchFamily="34" charset="-34"/>
+              </a:rPr>
+              <a:t>或</a:t>
+            </a:r>
+            <a:r>
+              <a:rPr lang="en-US" sz="1600">
+                <a:latin typeface="Leelawadee UI" panose="020B0502040204020203" pitchFamily="34" charset="-34"/>
+                <a:ea typeface="Microsoft JhengHei Light" panose="020B0304030504040204" pitchFamily="34" charset="-120"/>
+                <a:cs typeface="Leelawadee UI" panose="020B0502040204020203" pitchFamily="34" charset="-34"/>
+              </a:rPr>
+              <a:t> 3.3V </a:t>
+            </a:r>
+            <a:r>
+              <a:rPr lang="zh-CN" altLang="en-US" sz="1600">
+                <a:latin typeface="华文楷体" panose="02010600040101010101" pitchFamily="2" charset="-122"/>
+                <a:ea typeface="华文楷体" panose="02010600040101010101" pitchFamily="2" charset="-122"/>
+                <a:cs typeface="Leelawadee UI" panose="020B0502040204020203" pitchFamily="34" charset="-34"/>
+              </a:rPr>
+              <a:t>电压</a:t>
+            </a:r>
+            <a:endParaRPr lang="en-US" altLang="zh-CN" sz="1600">
+              <a:latin typeface="华文楷体" panose="02010600040101010101" pitchFamily="2" charset="-122"/>
+              <a:ea typeface="华文楷体" panose="02010600040101010101" pitchFamily="2" charset="-122"/>
+              <a:cs typeface="Leelawadee UI" panose="020B0502040204020203" pitchFamily="34" charset="-34"/>
+            </a:endParaRPr>
+          </a:p>
+          <a:p>
+            <a:pPr>
+              <a:lnSpc>
+                <a:spcPts val="2500"/>
+              </a:lnSpc>
+            </a:pPr>
+            <a:r>
+              <a:rPr lang="en-US" sz="1600">
+                <a:latin typeface="Leelawadee UI" panose="020B0502040204020203" pitchFamily="34" charset="-34"/>
+                <a:ea typeface="Microsoft JhengHei Light" panose="020B0304030504040204" pitchFamily="34" charset="-120"/>
+                <a:cs typeface="Leelawadee UI" panose="020B0502040204020203" pitchFamily="34" charset="-34"/>
+              </a:rPr>
+              <a:t>SIG2: </a:t>
+            </a:r>
+            <a:r>
+              <a:rPr lang="zh-CN" altLang="en-US" sz="1600">
+                <a:latin typeface="华文楷体" panose="02010600040101010101" pitchFamily="2" charset="-122"/>
+                <a:ea typeface="华文楷体" panose="02010600040101010101" pitchFamily="2" charset="-122"/>
+                <a:cs typeface="Leelawadee UI" panose="020B0502040204020203" pitchFamily="34" charset="-34"/>
+              </a:rPr>
+              <a:t>默认为高电平，通道</a:t>
+            </a:r>
+            <a:r>
+              <a:rPr lang="en-US" altLang="zh-CN" sz="1600">
+                <a:latin typeface="华文楷体" panose="02010600040101010101" pitchFamily="2" charset="-122"/>
+                <a:ea typeface="华文楷体" panose="02010600040101010101" pitchFamily="2" charset="-122"/>
+                <a:cs typeface="Leelawadee UI" panose="020B0502040204020203" pitchFamily="34" charset="-34"/>
+              </a:rPr>
+              <a:t>2</a:t>
+            </a:r>
+            <a:r>
+              <a:rPr lang="zh-CN" altLang="en-US" sz="1600">
+                <a:latin typeface="华文楷体" panose="02010600040101010101" pitchFamily="2" charset="-122"/>
+                <a:ea typeface="华文楷体" panose="02010600040101010101" pitchFamily="2" charset="-122"/>
+                <a:cs typeface="Leelawadee UI" panose="020B0502040204020203" pitchFamily="34" charset="-34"/>
+              </a:rPr>
+              <a:t>的输出，通道</a:t>
+            </a:r>
+            <a:r>
+              <a:rPr lang="en-US" altLang="zh-CN" sz="1600">
+                <a:latin typeface="华文楷体" panose="02010600040101010101" pitchFamily="2" charset="-122"/>
+                <a:ea typeface="华文楷体" panose="02010600040101010101" pitchFamily="2" charset="-122"/>
+                <a:cs typeface="Leelawadee UI" panose="020B0502040204020203" pitchFamily="34" charset="-34"/>
+              </a:rPr>
+              <a:t>2</a:t>
+            </a:r>
+            <a:r>
+              <a:rPr lang="zh-CN" altLang="en-US" sz="1600">
+                <a:latin typeface="华文楷体" panose="02010600040101010101" pitchFamily="2" charset="-122"/>
+                <a:ea typeface="华文楷体" panose="02010600040101010101" pitchFamily="2" charset="-122"/>
+                <a:cs typeface="Leelawadee UI" panose="020B0502040204020203" pitchFamily="34" charset="-34"/>
+              </a:rPr>
+              <a:t>连接到光电晶体管探测器</a:t>
+            </a:r>
+            <a:r>
+              <a:rPr lang="en-US" altLang="zh-CN" sz="1600">
+                <a:latin typeface="华文楷体" panose="02010600040101010101" pitchFamily="2" charset="-122"/>
+                <a:ea typeface="华文楷体" panose="02010600040101010101" pitchFamily="2" charset="-122"/>
+                <a:cs typeface="Leelawadee UI" panose="020B0502040204020203" pitchFamily="34" charset="-34"/>
+              </a:rPr>
+              <a:t>2</a:t>
+            </a:r>
+          </a:p>
+          <a:p>
+            <a:pPr>
+              <a:lnSpc>
+                <a:spcPts val="2500"/>
+              </a:lnSpc>
+            </a:pPr>
+            <a:r>
+              <a:rPr lang="en-US" sz="1600">
+                <a:latin typeface="Leelawadee UI" panose="020B0502040204020203" pitchFamily="34" charset="-34"/>
+                <a:ea typeface="Microsoft JhengHei Light" panose="020B0304030504040204" pitchFamily="34" charset="-120"/>
+                <a:cs typeface="Leelawadee UI" panose="020B0502040204020203" pitchFamily="34" charset="-34"/>
+              </a:rPr>
+              <a:t>SIG1: </a:t>
+            </a:r>
+            <a:r>
+              <a:rPr lang="zh-CN" altLang="en-US" sz="1600">
+                <a:latin typeface="华文楷体" panose="02010600040101010101" pitchFamily="2" charset="-122"/>
+                <a:ea typeface="华文楷体" panose="02010600040101010101" pitchFamily="2" charset="-122"/>
+                <a:cs typeface="Leelawadee UI" panose="020B0502040204020203" pitchFamily="34" charset="-34"/>
+              </a:rPr>
+              <a:t>默认为高电平，通道</a:t>
+            </a:r>
+            <a:r>
+              <a:rPr lang="en-US" altLang="zh-CN" sz="1600">
+                <a:latin typeface="华文楷体" panose="02010600040101010101" pitchFamily="2" charset="-122"/>
+                <a:ea typeface="华文楷体" panose="02010600040101010101" pitchFamily="2" charset="-122"/>
+                <a:cs typeface="Leelawadee UI" panose="020B0502040204020203" pitchFamily="34" charset="-34"/>
+              </a:rPr>
+              <a:t>1</a:t>
+            </a:r>
+            <a:r>
+              <a:rPr lang="zh-CN" altLang="en-US" sz="1600">
+                <a:latin typeface="华文楷体" panose="02010600040101010101" pitchFamily="2" charset="-122"/>
+                <a:ea typeface="华文楷体" panose="02010600040101010101" pitchFamily="2" charset="-122"/>
+                <a:cs typeface="Leelawadee UI" panose="020B0502040204020203" pitchFamily="34" charset="-34"/>
+              </a:rPr>
+              <a:t>的输出，通道</a:t>
+            </a:r>
+            <a:r>
+              <a:rPr lang="en-US" altLang="zh-CN" sz="1600">
+                <a:latin typeface="华文楷体" panose="02010600040101010101" pitchFamily="2" charset="-122"/>
+                <a:ea typeface="华文楷体" panose="02010600040101010101" pitchFamily="2" charset="-122"/>
+                <a:cs typeface="Leelawadee UI" panose="020B0502040204020203" pitchFamily="34" charset="-34"/>
+              </a:rPr>
+              <a:t>1</a:t>
+            </a:r>
+            <a:r>
+              <a:rPr lang="zh-CN" altLang="en-US" sz="1600">
+                <a:latin typeface="华文楷体" panose="02010600040101010101" pitchFamily="2" charset="-122"/>
+                <a:ea typeface="华文楷体" panose="02010600040101010101" pitchFamily="2" charset="-122"/>
+                <a:cs typeface="Leelawadee UI" panose="020B0502040204020203" pitchFamily="34" charset="-34"/>
+              </a:rPr>
+              <a:t>连接到光电晶体管探测器</a:t>
+            </a:r>
+            <a:r>
+              <a:rPr lang="en-US" altLang="zh-CN" sz="1600">
+                <a:latin typeface="华文楷体" panose="02010600040101010101" pitchFamily="2" charset="-122"/>
+                <a:ea typeface="华文楷体" panose="02010600040101010101" pitchFamily="2" charset="-122"/>
+                <a:cs typeface="Leelawadee UI" panose="020B0502040204020203" pitchFamily="34" charset="-34"/>
+              </a:rPr>
+              <a:t>1</a:t>
+            </a:r>
+            <a:endParaRPr lang="en-US" sz="1200">
+              <a:solidFill>
+                <a:srgbClr val="D4D4D4"/>
+              </a:solidFill>
+              <a:latin typeface="华文楷体" panose="02010600040101010101" pitchFamily="2" charset="-122"/>
+              <a:ea typeface="华文楷体" panose="02010600040101010101" pitchFamily="2" charset="-122"/>
+            </a:endParaRPr>
+          </a:p>
+          <a:p>
+            <a:endParaRPr lang="en-US" sz="1200">
+              <a:solidFill>
+                <a:srgbClr val="D4D4D4"/>
+              </a:solidFill>
+              <a:latin typeface="Consolas" panose="020B0609020204030204" pitchFamily="49" charset="0"/>
+            </a:endParaRPr>
+          </a:p>
+          <a:p>
+            <a:endParaRPr lang="en-US" sz="1200">
+              <a:latin typeface="Times New Roman" panose="02020603050405020304" pitchFamily="18" charset="0"/>
+              <a:cs typeface="Times New Roman" panose="02020603050405020304" pitchFamily="18" charset="0"/>
+            </a:endParaRPr>
+          </a:p>
+          <a:p>
+            <a:endParaRPr lang="en-US" sz="1200">
+              <a:latin typeface="Times New Roman" panose="02020603050405020304" pitchFamily="18" charset="0"/>
+              <a:cs typeface="Times New Roman" panose="02020603050405020304" pitchFamily="18" charset="0"/>
+            </a:endParaRPr>
+          </a:p>
+          <a:p>
+            <a:endParaRPr lang="en-US"/>
+          </a:p>
+        </p:txBody>
+      </p:sp>
+      <p:grpSp>
+        <p:nvGrpSpPr>
+          <p:cNvPr id="2" name="组合 1">
+            <a:extLst>
+              <a:ext uri="{FF2B5EF4-FFF2-40B4-BE49-F238E27FC236}">
+                <a16:creationId xmlns:a16="http://schemas.microsoft.com/office/drawing/2014/main" id="{824D493F-1853-4A3A-86B7-C95C01AE00F9}"/>
+              </a:ext>
+            </a:extLst>
+          </p:cNvPr>
+          <p:cNvGrpSpPr/>
+          <p:nvPr/>
+        </p:nvGrpSpPr>
+        <p:grpSpPr>
+          <a:xfrm>
+            <a:off x="2136298" y="1486948"/>
+            <a:ext cx="476250" cy="1886426"/>
+            <a:chOff x="2261625" y="1357253"/>
+            <a:chExt cx="476250" cy="1886426"/>
+          </a:xfrm>
+        </p:grpSpPr>
+        <p:pic>
+          <p:nvPicPr>
+            <p:cNvPr id="48" name="图片 47">
+              <a:extLst>
+                <a:ext uri="{FF2B5EF4-FFF2-40B4-BE49-F238E27FC236}">
+                  <a16:creationId xmlns:a16="http://schemas.microsoft.com/office/drawing/2014/main" id="{6A1EF724-C083-4718-B12B-ADE4CD6E6593}"/>
+                </a:ext>
+              </a:extLst>
+            </p:cNvPr>
+            <p:cNvPicPr>
+              <a:picLocks noChangeAspect="1"/>
+            </p:cNvPicPr>
+            <p:nvPr/>
+          </p:nvPicPr>
+          <p:blipFill>
+            <a:blip r:embed="rId3">
+              <a:extLst>
+                <a:ext uri="{28A0092B-C50C-407E-A947-70E740481C1C}">
+                  <a14:useLocalDpi xmlns:a14="http://schemas.microsoft.com/office/drawing/2010/main" val="0"/>
+                </a:ext>
+              </a:extLst>
+            </a:blip>
+            <a:stretch>
+              <a:fillRect/>
+            </a:stretch>
+          </p:blipFill>
+          <p:spPr>
+            <a:xfrm>
+              <a:off x="2261625" y="1827312"/>
+              <a:ext cx="476250" cy="476250"/>
+            </a:xfrm>
+            <a:prstGeom prst="rect">
+              <a:avLst/>
+            </a:prstGeom>
+          </p:spPr>
+        </p:pic>
+        <p:pic>
+          <p:nvPicPr>
+            <p:cNvPr id="51" name="图片 50">
+              <a:extLst>
+                <a:ext uri="{FF2B5EF4-FFF2-40B4-BE49-F238E27FC236}">
+                  <a16:creationId xmlns:a16="http://schemas.microsoft.com/office/drawing/2014/main" id="{B4A0FEB6-8C80-4A2D-A4DA-3DD6CF6BF267}"/>
+                </a:ext>
+              </a:extLst>
+            </p:cNvPr>
+            <p:cNvPicPr>
+              <a:picLocks noChangeAspect="1"/>
+            </p:cNvPicPr>
+            <p:nvPr/>
+          </p:nvPicPr>
+          <p:blipFill>
+            <a:blip r:embed="rId4">
+              <a:extLst>
+                <a:ext uri="{28A0092B-C50C-407E-A947-70E740481C1C}">
+                  <a14:useLocalDpi xmlns:a14="http://schemas.microsoft.com/office/drawing/2010/main" val="0"/>
+                </a:ext>
+              </a:extLst>
+            </a:blip>
+            <a:stretch>
+              <a:fillRect/>
+            </a:stretch>
+          </p:blipFill>
+          <p:spPr>
+            <a:xfrm>
+              <a:off x="2261625" y="1357253"/>
+              <a:ext cx="476250" cy="476250"/>
+            </a:xfrm>
+            <a:prstGeom prst="rect">
+              <a:avLst/>
+            </a:prstGeom>
+          </p:spPr>
+        </p:pic>
+        <p:pic>
+          <p:nvPicPr>
+            <p:cNvPr id="53" name="图片 52">
+              <a:extLst>
+                <a:ext uri="{FF2B5EF4-FFF2-40B4-BE49-F238E27FC236}">
+                  <a16:creationId xmlns:a16="http://schemas.microsoft.com/office/drawing/2014/main" id="{F5F78553-6083-4B94-9258-235169F8D486}"/>
+                </a:ext>
+              </a:extLst>
+            </p:cNvPr>
+            <p:cNvPicPr>
+              <a:picLocks noChangeAspect="1"/>
+            </p:cNvPicPr>
+            <p:nvPr/>
+          </p:nvPicPr>
+          <p:blipFill>
+            <a:blip r:embed="rId5">
+              <a:extLst>
+                <a:ext uri="{28A0092B-C50C-407E-A947-70E740481C1C}">
+                  <a14:useLocalDpi xmlns:a14="http://schemas.microsoft.com/office/drawing/2010/main" val="0"/>
+                </a:ext>
+              </a:extLst>
+            </a:blip>
+            <a:stretch>
+              <a:fillRect/>
+            </a:stretch>
+          </p:blipFill>
+          <p:spPr>
+            <a:xfrm>
+              <a:off x="2261625" y="2767429"/>
+              <a:ext cx="476250" cy="476250"/>
+            </a:xfrm>
+            <a:prstGeom prst="rect">
+              <a:avLst/>
+            </a:prstGeom>
+          </p:spPr>
+        </p:pic>
+        <p:pic>
+          <p:nvPicPr>
+            <p:cNvPr id="55" name="图片 54">
+              <a:extLst>
+                <a:ext uri="{FF2B5EF4-FFF2-40B4-BE49-F238E27FC236}">
+                  <a16:creationId xmlns:a16="http://schemas.microsoft.com/office/drawing/2014/main" id="{78F94C4E-FBEE-4618-B471-EC4E70DB63F7}"/>
+                </a:ext>
+              </a:extLst>
+            </p:cNvPr>
+            <p:cNvPicPr>
+              <a:picLocks noChangeAspect="1"/>
+            </p:cNvPicPr>
+            <p:nvPr/>
+          </p:nvPicPr>
+          <p:blipFill>
+            <a:blip r:embed="rId6">
+              <a:extLst>
+                <a:ext uri="{28A0092B-C50C-407E-A947-70E740481C1C}">
+                  <a14:useLocalDpi xmlns:a14="http://schemas.microsoft.com/office/drawing/2010/main" val="0"/>
+                </a:ext>
+              </a:extLst>
+            </a:blip>
+            <a:stretch>
+              <a:fillRect/>
+            </a:stretch>
+          </p:blipFill>
+          <p:spPr>
+            <a:xfrm>
+              <a:off x="2261625" y="2297371"/>
+              <a:ext cx="476250" cy="476250"/>
+            </a:xfrm>
+            <a:prstGeom prst="rect">
+              <a:avLst/>
+            </a:prstGeom>
+          </p:spPr>
+        </p:pic>
+      </p:grpSp>
+      <p:pic>
+        <p:nvPicPr>
+          <p:cNvPr id="63" name="图片 62">
+            <a:extLst>
+              <a:ext uri="{FF2B5EF4-FFF2-40B4-BE49-F238E27FC236}">
+                <a16:creationId xmlns:a16="http://schemas.microsoft.com/office/drawing/2014/main" id="{A383C15E-94CC-4AB9-857B-0F901B5558E8}"/>
+              </a:ext>
+            </a:extLst>
+          </p:cNvPr>
+          <p:cNvPicPr>
+            <a:picLocks noChangeAspect="1"/>
+          </p:cNvPicPr>
+          <p:nvPr/>
+        </p:nvPicPr>
+        <p:blipFill>
+          <a:blip r:embed="rId3">
+            <a:extLst>
+              <a:ext uri="{28A0092B-C50C-407E-A947-70E740481C1C}">
+                <a14:useLocalDpi xmlns:a14="http://schemas.microsoft.com/office/drawing/2010/main" val="0"/>
+              </a:ext>
+            </a:extLst>
+          </a:blip>
+          <a:stretch>
+            <a:fillRect/>
+          </a:stretch>
+        </p:blipFill>
+        <p:spPr>
+          <a:xfrm>
+            <a:off x="2726661" y="4703519"/>
+            <a:ext cx="266700" cy="266700"/>
+          </a:xfrm>
+          <a:prstGeom prst="rect">
+            <a:avLst/>
+          </a:prstGeom>
+        </p:spPr>
+      </p:pic>
+      <p:pic>
+        <p:nvPicPr>
+          <p:cNvPr id="65" name="图片 64">
+            <a:extLst>
+              <a:ext uri="{FF2B5EF4-FFF2-40B4-BE49-F238E27FC236}">
+                <a16:creationId xmlns:a16="http://schemas.microsoft.com/office/drawing/2014/main" id="{F2711110-C802-4745-8C7A-EE197611809A}"/>
+              </a:ext>
+            </a:extLst>
+          </p:cNvPr>
+          <p:cNvPicPr>
+            <a:picLocks noChangeAspect="1"/>
+          </p:cNvPicPr>
+          <p:nvPr/>
+        </p:nvPicPr>
+        <p:blipFill>
+          <a:blip r:embed="rId4">
+            <a:extLst>
+              <a:ext uri="{28A0092B-C50C-407E-A947-70E740481C1C}">
+                <a14:useLocalDpi xmlns:a14="http://schemas.microsoft.com/office/drawing/2010/main" val="0"/>
+              </a:ext>
+            </a:extLst>
+          </a:blip>
+          <a:stretch>
+            <a:fillRect/>
+          </a:stretch>
+        </p:blipFill>
+        <p:spPr>
+          <a:xfrm>
+            <a:off x="2726661" y="4387214"/>
+            <a:ext cx="266700" cy="266700"/>
+          </a:xfrm>
+          <a:prstGeom prst="rect">
+            <a:avLst/>
+          </a:prstGeom>
+        </p:spPr>
+      </p:pic>
+      <p:pic>
+        <p:nvPicPr>
+          <p:cNvPr id="66" name="图片 65">
+            <a:extLst>
+              <a:ext uri="{FF2B5EF4-FFF2-40B4-BE49-F238E27FC236}">
+                <a16:creationId xmlns:a16="http://schemas.microsoft.com/office/drawing/2014/main" id="{6D42253D-4577-468B-9D40-058E91BD3363}"/>
+              </a:ext>
+            </a:extLst>
+          </p:cNvPr>
+          <p:cNvPicPr>
+            <a:picLocks noChangeAspect="1"/>
+          </p:cNvPicPr>
+          <p:nvPr/>
+        </p:nvPicPr>
+        <p:blipFill>
+          <a:blip r:embed="rId5">
+            <a:extLst>
+              <a:ext uri="{28A0092B-C50C-407E-A947-70E740481C1C}">
+                <a14:useLocalDpi xmlns:a14="http://schemas.microsoft.com/office/drawing/2010/main" val="0"/>
+              </a:ext>
+            </a:extLst>
+          </a:blip>
+          <a:stretch>
+            <a:fillRect/>
+          </a:stretch>
+        </p:blipFill>
+        <p:spPr>
+          <a:xfrm>
+            <a:off x="2726661" y="5336132"/>
+            <a:ext cx="266700" cy="266700"/>
+          </a:xfrm>
+          <a:prstGeom prst="rect">
+            <a:avLst/>
+          </a:prstGeom>
+        </p:spPr>
+      </p:pic>
+      <p:pic>
+        <p:nvPicPr>
+          <p:cNvPr id="67" name="图片 66">
+            <a:extLst>
+              <a:ext uri="{FF2B5EF4-FFF2-40B4-BE49-F238E27FC236}">
+                <a16:creationId xmlns:a16="http://schemas.microsoft.com/office/drawing/2014/main" id="{1A425AE3-AA60-415F-BD5E-43BFD600013A}"/>
+              </a:ext>
+            </a:extLst>
+          </p:cNvPr>
+          <p:cNvPicPr>
+            <a:picLocks noChangeAspect="1"/>
+          </p:cNvPicPr>
+          <p:nvPr/>
+        </p:nvPicPr>
+        <p:blipFill>
+          <a:blip r:embed="rId6">
+            <a:extLst>
+              <a:ext uri="{28A0092B-C50C-407E-A947-70E740481C1C}">
+                <a14:useLocalDpi xmlns:a14="http://schemas.microsoft.com/office/drawing/2010/main" val="0"/>
+              </a:ext>
+            </a:extLst>
+          </a:blip>
+          <a:stretch>
+            <a:fillRect/>
+          </a:stretch>
+        </p:blipFill>
+        <p:spPr>
+          <a:xfrm>
+            <a:off x="2726661" y="5019826"/>
+            <a:ext cx="266700" cy="266700"/>
+          </a:xfrm>
+          <a:prstGeom prst="rect">
+            <a:avLst/>
+          </a:prstGeom>
+        </p:spPr>
+      </p:pic>
+      <p:cxnSp>
+        <p:nvCxnSpPr>
+          <p:cNvPr id="26" name="直接连接符 25">
+            <a:extLst>
+              <a:ext uri="{FF2B5EF4-FFF2-40B4-BE49-F238E27FC236}">
+                <a16:creationId xmlns:a16="http://schemas.microsoft.com/office/drawing/2014/main" id="{5A013A8F-474A-464F-BE71-98D8CCDB3DE1}"/>
+              </a:ext>
+            </a:extLst>
+          </p:cNvPr>
+          <p:cNvCxnSpPr>
+            <a:cxnSpLocks/>
+            <a:stCxn id="48" idx="3"/>
+          </p:cNvCxnSpPr>
+          <p:nvPr/>
+        </p:nvCxnSpPr>
+        <p:spPr>
+          <a:xfrm>
+            <a:off x="2612548" y="2195132"/>
+            <a:ext cx="332590" cy="124828"/>
+          </a:xfrm>
+          <a:prstGeom prst="line">
+            <a:avLst/>
+          </a:prstGeom>
+          <a:ln w="12700" cap="flat" cmpd="sng" algn="ctr">
+            <a:solidFill>
+              <a:schemeClr val="accent3"/>
+            </a:solidFill>
+            <a:prstDash val="dash"/>
+            <a:round/>
+            <a:headEnd type="none" w="med" len="med"/>
+            <a:tailEnd type="none" w="med" len="med"/>
+          </a:ln>
+        </p:spPr>
+        <p:style>
+          <a:lnRef idx="0">
+            <a:scrgbClr r="0" g="0" b="0"/>
+          </a:lnRef>
+          <a:fillRef idx="0">
+            <a:scrgbClr r="0" g="0" b="0"/>
+          </a:fillRef>
+          <a:effectRef idx="0">
+            <a:scrgbClr r="0" g="0" b="0"/>
+          </a:effectRef>
+          <a:fontRef idx="minor">
+            <a:schemeClr val="tx1"/>
+          </a:fontRef>
+        </p:style>
+      </p:cxnSp>
+      <p:cxnSp>
+        <p:nvCxnSpPr>
+          <p:cNvPr id="28" name="直接连接符 27">
+            <a:extLst>
+              <a:ext uri="{FF2B5EF4-FFF2-40B4-BE49-F238E27FC236}">
+                <a16:creationId xmlns:a16="http://schemas.microsoft.com/office/drawing/2014/main" id="{D7D15446-C1CF-4AA3-A9CB-678047945342}"/>
+              </a:ext>
+            </a:extLst>
+          </p:cNvPr>
+          <p:cNvCxnSpPr>
+            <a:cxnSpLocks/>
+            <a:stCxn id="55" idx="3"/>
+          </p:cNvCxnSpPr>
+          <p:nvPr/>
+        </p:nvCxnSpPr>
+        <p:spPr>
+          <a:xfrm flipV="1">
+            <a:off x="2612548" y="2540363"/>
+            <a:ext cx="329571" cy="124828"/>
+          </a:xfrm>
+          <a:prstGeom prst="line">
+            <a:avLst/>
+          </a:prstGeom>
+          <a:ln w="12700" cap="flat" cmpd="sng" algn="ctr">
+            <a:solidFill>
+              <a:schemeClr val="accent3"/>
+            </a:solidFill>
+            <a:prstDash val="dash"/>
+            <a:round/>
+            <a:headEnd type="none" w="med" len="med"/>
+            <a:tailEnd type="none" w="med" len="med"/>
+          </a:ln>
+        </p:spPr>
+        <p:style>
+          <a:lnRef idx="0">
+            <a:scrgbClr r="0" g="0" b="0"/>
+          </a:lnRef>
+          <a:fillRef idx="0">
+            <a:scrgbClr r="0" g="0" b="0"/>
+          </a:fillRef>
+          <a:effectRef idx="0">
+            <a:scrgbClr r="0" g="0" b="0"/>
+          </a:effectRef>
+          <a:fontRef idx="minor">
+            <a:schemeClr val="tx1"/>
+          </a:fontRef>
+        </p:style>
+      </p:cxnSp>
+      <p:pic>
+        <p:nvPicPr>
+          <p:cNvPr id="3" name="图片 2">
+            <a:extLst>
+              <a:ext uri="{FF2B5EF4-FFF2-40B4-BE49-F238E27FC236}">
+                <a16:creationId xmlns:a16="http://schemas.microsoft.com/office/drawing/2014/main" id="{A86ECBA1-323B-4E1A-8529-912A4309542B}"/>
+              </a:ext>
+            </a:extLst>
+          </p:cNvPr>
+          <p:cNvPicPr>
+            <a:picLocks noChangeAspect="1"/>
+          </p:cNvPicPr>
+          <p:nvPr/>
+        </p:nvPicPr>
+        <p:blipFill>
+          <a:blip r:embed="rId7"/>
+          <a:stretch>
+            <a:fillRect/>
+          </a:stretch>
+        </p:blipFill>
+        <p:spPr>
+          <a:xfrm>
+            <a:off x="8696663" y="986584"/>
+            <a:ext cx="1602675" cy="1553779"/>
+          </a:xfrm>
+          <a:prstGeom prst="rect">
+            <a:avLst/>
+          </a:prstGeom>
+          <a:ln>
+            <a:noFill/>
+          </a:ln>
+        </p:spPr>
+      </p:pic>
+      <p:sp>
+        <p:nvSpPr>
+          <p:cNvPr id="4" name="椭圆 3">
+            <a:extLst>
+              <a:ext uri="{FF2B5EF4-FFF2-40B4-BE49-F238E27FC236}">
+                <a16:creationId xmlns:a16="http://schemas.microsoft.com/office/drawing/2014/main" id="{BC38CD3E-EA7A-4260-BC00-E057F7539592}"/>
+              </a:ext>
+            </a:extLst>
+          </p:cNvPr>
+          <p:cNvSpPr/>
+          <p:nvPr/>
+        </p:nvSpPr>
+        <p:spPr>
+          <a:xfrm>
+            <a:off x="8723210" y="991366"/>
+            <a:ext cx="1602675" cy="1548997"/>
+          </a:xfrm>
+          <a:prstGeom prst="ellipse">
+            <a:avLst/>
+          </a:prstGeom>
+          <a:solidFill>
+            <a:schemeClr val="accent1">
+              <a:alpha val="0"/>
+            </a:schemeClr>
+          </a:solidFill>
+          <a:ln w="22225">
+            <a:solidFill>
+              <a:schemeClr val="bg1">
+                <a:lumMod val="65000"/>
+                <a:alpha val="66000"/>
+              </a:schemeClr>
+            </a:solidFill>
+            <a:prstDash val="sysDot"/>
+          </a:ln>
+        </p:spPr>
+        <p:style>
+          <a:lnRef idx="2">
+            <a:schemeClr val="accent1">
+              <a:shade val="50000"/>
+            </a:schemeClr>
+          </a:lnRef>
+          <a:fillRef idx="1">
+            <a:schemeClr val="accent1"/>
+          </a:fillRef>
+          <a:effectRef idx="0">
+            <a:schemeClr val="accent1"/>
+          </a:effectRef>
+          <a:fontRef idx="minor">
+            <a:schemeClr val="lt1"/>
+          </a:fontRef>
+        </p:style>
+        <p:txBody>
+          <a:bodyPr rtlCol="0" anchor="ctr"/>
+          <a:lstStyle/>
+          <a:p>
+            <a:pPr algn="ctr"/>
+            <a:endParaRPr lang="en-US"/>
+          </a:p>
+        </p:txBody>
+      </p:sp>
+      <p:cxnSp>
+        <p:nvCxnSpPr>
+          <p:cNvPr id="10" name="直接连接符 9">
+            <a:extLst>
+              <a:ext uri="{FF2B5EF4-FFF2-40B4-BE49-F238E27FC236}">
+                <a16:creationId xmlns:a16="http://schemas.microsoft.com/office/drawing/2014/main" id="{48500244-9578-4BBC-8EDA-3AE94355F653}"/>
+              </a:ext>
+            </a:extLst>
+          </p:cNvPr>
+          <p:cNvCxnSpPr>
+            <a:cxnSpLocks/>
+            <a:stCxn id="35" idx="7"/>
+          </p:cNvCxnSpPr>
+          <p:nvPr/>
+        </p:nvCxnSpPr>
+        <p:spPr>
+          <a:xfrm flipV="1">
+            <a:off x="6708512" y="1765865"/>
+            <a:ext cx="848684" cy="669754"/>
+          </a:xfrm>
+          <a:prstGeom prst="line">
+            <a:avLst/>
+          </a:prstGeom>
+          <a:ln w="15875">
+            <a:solidFill>
+              <a:schemeClr val="bg1">
+                <a:lumMod val="65000"/>
+              </a:schemeClr>
+            </a:solidFill>
+            <a:prstDash val="dash"/>
+          </a:ln>
+        </p:spPr>
+        <p:style>
+          <a:lnRef idx="1">
+            <a:schemeClr val="accent1"/>
+          </a:lnRef>
+          <a:fillRef idx="0">
+            <a:schemeClr val="accent1"/>
+          </a:fillRef>
+          <a:effectRef idx="0">
+            <a:schemeClr val="accent1"/>
+          </a:effectRef>
+          <a:fontRef idx="minor">
+            <a:schemeClr val="tx1"/>
+          </a:fontRef>
+        </p:style>
+      </p:cxnSp>
+      <p:cxnSp>
+        <p:nvCxnSpPr>
+          <p:cNvPr id="16" name="直接连接符 15">
+            <a:extLst>
+              <a:ext uri="{FF2B5EF4-FFF2-40B4-BE49-F238E27FC236}">
+                <a16:creationId xmlns:a16="http://schemas.microsoft.com/office/drawing/2014/main" id="{FA096141-0717-4ED6-AE68-54E445D38070}"/>
+              </a:ext>
+            </a:extLst>
+          </p:cNvPr>
+          <p:cNvCxnSpPr>
+            <a:cxnSpLocks/>
+            <a:endCxn id="4" idx="2"/>
+          </p:cNvCxnSpPr>
+          <p:nvPr/>
+        </p:nvCxnSpPr>
+        <p:spPr>
+          <a:xfrm>
+            <a:off x="7557196" y="1765865"/>
+            <a:ext cx="1166014" cy="0"/>
+          </a:xfrm>
+          <a:prstGeom prst="line">
+            <a:avLst/>
+          </a:prstGeom>
+          <a:ln w="15875">
+            <a:solidFill>
+              <a:schemeClr val="bg1">
+                <a:lumMod val="65000"/>
+              </a:schemeClr>
+            </a:solidFill>
+            <a:prstDash val="dash"/>
+          </a:ln>
+        </p:spPr>
+        <p:style>
+          <a:lnRef idx="1">
+            <a:schemeClr val="accent1"/>
+          </a:lnRef>
+          <a:fillRef idx="0">
+            <a:schemeClr val="accent1"/>
+          </a:fillRef>
+          <a:effectRef idx="0">
+            <a:schemeClr val="accent1"/>
+          </a:effectRef>
+          <a:fontRef idx="minor">
+            <a:schemeClr val="tx1"/>
+          </a:fontRef>
+        </p:style>
+      </p:cxnSp>
+      <p:sp>
+        <p:nvSpPr>
+          <p:cNvPr id="35" name="椭圆 34">
+            <a:extLst>
+              <a:ext uri="{FF2B5EF4-FFF2-40B4-BE49-F238E27FC236}">
+                <a16:creationId xmlns:a16="http://schemas.microsoft.com/office/drawing/2014/main" id="{91655C1A-9D91-4F60-87A7-73D30157A1F4}"/>
+              </a:ext>
+            </a:extLst>
+          </p:cNvPr>
+          <p:cNvSpPr>
+            <a:spLocks noChangeAspect="1"/>
+          </p:cNvSpPr>
+          <p:nvPr/>
+        </p:nvSpPr>
+        <p:spPr>
+          <a:xfrm>
+            <a:off x="6620490" y="2420517"/>
+            <a:ext cx="103124" cy="103124"/>
+          </a:xfrm>
+          <a:prstGeom prst="ellipse">
+            <a:avLst/>
+          </a:prstGeom>
+          <a:solidFill>
+            <a:srgbClr val="FFC000"/>
+          </a:solidFill>
+          <a:ln>
+            <a:solidFill>
+              <a:srgbClr val="FFC000"/>
+            </a:solidFill>
+          </a:ln>
+        </p:spPr>
+        <p:style>
+          <a:lnRef idx="2">
+            <a:schemeClr val="accent1">
+              <a:shade val="50000"/>
+            </a:schemeClr>
+          </a:lnRef>
+          <a:fillRef idx="1">
+            <a:schemeClr val="accent1"/>
+          </a:fillRef>
+          <a:effectRef idx="0">
+            <a:schemeClr val="accent1"/>
+          </a:effectRef>
+          <a:fontRef idx="minor">
+            <a:schemeClr val="lt1"/>
+          </a:fontRef>
+        </p:style>
+        <p:txBody>
+          <a:bodyPr rtlCol="0" anchor="ctr"/>
+          <a:lstStyle/>
+          <a:p>
+            <a:pPr algn="ctr"/>
+            <a:endParaRPr lang="en-US"/>
+          </a:p>
+        </p:txBody>
+      </p:sp>
+      <p:pic>
+        <p:nvPicPr>
+          <p:cNvPr id="37" name="图片 36">
+            <a:extLst>
+              <a:ext uri="{FF2B5EF4-FFF2-40B4-BE49-F238E27FC236}">
+                <a16:creationId xmlns:a16="http://schemas.microsoft.com/office/drawing/2014/main" id="{1EC4CA65-ECC9-4A53-AB4D-902180745D68}"/>
+              </a:ext>
+            </a:extLst>
+          </p:cNvPr>
+          <p:cNvPicPr>
+            <a:picLocks noChangeAspect="1"/>
+          </p:cNvPicPr>
+          <p:nvPr/>
+        </p:nvPicPr>
+        <p:blipFill>
+          <a:blip r:embed="rId8">
+            <a:extLst>
+              <a:ext uri="{28A0092B-C50C-407E-A947-70E740481C1C}">
+                <a14:useLocalDpi xmlns:a14="http://schemas.microsoft.com/office/drawing/2010/main" val="0"/>
+              </a:ext>
+            </a:extLst>
+          </a:blip>
+          <a:stretch>
+            <a:fillRect/>
+          </a:stretch>
+        </p:blipFill>
+        <p:spPr>
+          <a:xfrm>
+            <a:off x="6078629" y="3548105"/>
+            <a:ext cx="472059" cy="472059"/>
+          </a:xfrm>
+          <a:prstGeom prst="rect">
+            <a:avLst/>
+          </a:prstGeom>
+        </p:spPr>
+      </p:pic>
+      <p:pic>
+        <p:nvPicPr>
+          <p:cNvPr id="38" name="图片 37">
+            <a:extLst>
+              <a:ext uri="{FF2B5EF4-FFF2-40B4-BE49-F238E27FC236}">
+                <a16:creationId xmlns:a16="http://schemas.microsoft.com/office/drawing/2014/main" id="{9A555F14-F470-4B6E-93A4-FE9220C17571}"/>
+              </a:ext>
+            </a:extLst>
+          </p:cNvPr>
+          <p:cNvPicPr>
+            <a:picLocks noChangeAspect="1"/>
+          </p:cNvPicPr>
+          <p:nvPr/>
+        </p:nvPicPr>
+        <p:blipFill>
+          <a:blip r:embed="rId9">
+            <a:extLst>
+              <a:ext uri="{28A0092B-C50C-407E-A947-70E740481C1C}">
+                <a14:useLocalDpi xmlns:a14="http://schemas.microsoft.com/office/drawing/2010/main" val="0"/>
+              </a:ext>
+            </a:extLst>
+          </a:blip>
+          <a:stretch>
+            <a:fillRect/>
+          </a:stretch>
+        </p:blipFill>
+        <p:spPr>
+          <a:xfrm>
+            <a:off x="6066455" y="827494"/>
+            <a:ext cx="472059" cy="472059"/>
+          </a:xfrm>
+          <a:prstGeom prst="rect">
+            <a:avLst/>
+          </a:prstGeom>
+        </p:spPr>
+      </p:pic>
+      <p:sp>
+        <p:nvSpPr>
+          <p:cNvPr id="39" name="椭圆 38">
+            <a:extLst>
+              <a:ext uri="{FF2B5EF4-FFF2-40B4-BE49-F238E27FC236}">
+                <a16:creationId xmlns:a16="http://schemas.microsoft.com/office/drawing/2014/main" id="{F9669972-2CCB-4D45-9180-C78EF7C8C03F}"/>
+              </a:ext>
+            </a:extLst>
+          </p:cNvPr>
+          <p:cNvSpPr>
+            <a:spLocks noChangeAspect="1"/>
+          </p:cNvSpPr>
+          <p:nvPr/>
+        </p:nvSpPr>
+        <p:spPr>
+          <a:xfrm>
+            <a:off x="6252125" y="2172128"/>
+            <a:ext cx="103124" cy="103124"/>
+          </a:xfrm>
+          <a:prstGeom prst="ellipse">
+            <a:avLst/>
+          </a:prstGeom>
+          <a:solidFill>
+            <a:srgbClr val="FFC000"/>
+          </a:solidFill>
+          <a:ln>
+            <a:solidFill>
+              <a:srgbClr val="FFC000"/>
+            </a:solidFill>
+          </a:ln>
+        </p:spPr>
+        <p:style>
+          <a:lnRef idx="2">
+            <a:schemeClr val="accent1">
+              <a:shade val="50000"/>
+            </a:schemeClr>
+          </a:lnRef>
+          <a:fillRef idx="1">
+            <a:schemeClr val="accent1"/>
+          </a:fillRef>
+          <a:effectRef idx="0">
+            <a:schemeClr val="accent1"/>
+          </a:effectRef>
+          <a:fontRef idx="minor">
+            <a:schemeClr val="lt1"/>
+          </a:fontRef>
+        </p:style>
+        <p:txBody>
+          <a:bodyPr rtlCol="0" anchor="ctr"/>
+          <a:lstStyle/>
+          <a:p>
+            <a:pPr algn="ctr"/>
+            <a:endParaRPr lang="en-US"/>
+          </a:p>
+        </p:txBody>
+      </p:sp>
+      <p:cxnSp>
+        <p:nvCxnSpPr>
+          <p:cNvPr id="40" name="直接连接符 39">
+            <a:extLst>
+              <a:ext uri="{FF2B5EF4-FFF2-40B4-BE49-F238E27FC236}">
+                <a16:creationId xmlns:a16="http://schemas.microsoft.com/office/drawing/2014/main" id="{6EE0FDCA-F8B1-4B7D-9B32-C52C4DB516F9}"/>
+              </a:ext>
+            </a:extLst>
+          </p:cNvPr>
+          <p:cNvCxnSpPr>
+            <a:cxnSpLocks/>
+          </p:cNvCxnSpPr>
+          <p:nvPr/>
+        </p:nvCxnSpPr>
+        <p:spPr>
+          <a:xfrm>
+            <a:off x="6302485" y="1272076"/>
+            <a:ext cx="0" cy="850035"/>
+          </a:xfrm>
+          <a:prstGeom prst="line">
+            <a:avLst/>
+          </a:prstGeom>
+          <a:ln w="15875" cap="flat" cmpd="sng" algn="ctr">
+            <a:solidFill>
+              <a:schemeClr val="accent3"/>
+            </a:solidFill>
+            <a:prstDash val="dash"/>
+            <a:round/>
+            <a:headEnd type="none" w="med" len="med"/>
+            <a:tailEnd type="none" w="med" len="med"/>
+          </a:ln>
+        </p:spPr>
+        <p:style>
+          <a:lnRef idx="0">
+            <a:scrgbClr r="0" g="0" b="0"/>
+          </a:lnRef>
+          <a:fillRef idx="0">
+            <a:scrgbClr r="0" g="0" b="0"/>
+          </a:fillRef>
+          <a:effectRef idx="0">
+            <a:scrgbClr r="0" g="0" b="0"/>
+          </a:effectRef>
+          <a:fontRef idx="minor">
+            <a:schemeClr val="tx1"/>
+          </a:fontRef>
+        </p:style>
+      </p:cxnSp>
+      <p:sp>
+        <p:nvSpPr>
+          <p:cNvPr id="43" name="椭圆 42">
+            <a:extLst>
+              <a:ext uri="{FF2B5EF4-FFF2-40B4-BE49-F238E27FC236}">
+                <a16:creationId xmlns:a16="http://schemas.microsoft.com/office/drawing/2014/main" id="{2351A025-8D5D-4615-B5DF-8DDB64E94D4F}"/>
+              </a:ext>
+            </a:extLst>
+          </p:cNvPr>
+          <p:cNvSpPr>
+            <a:spLocks noChangeAspect="1"/>
+          </p:cNvSpPr>
+          <p:nvPr/>
+        </p:nvSpPr>
+        <p:spPr>
+          <a:xfrm>
+            <a:off x="6250923" y="2388637"/>
+            <a:ext cx="103124" cy="103124"/>
+          </a:xfrm>
+          <a:prstGeom prst="ellipse">
+            <a:avLst/>
+          </a:prstGeom>
+          <a:solidFill>
+            <a:srgbClr val="FFC000"/>
+          </a:solidFill>
+          <a:ln>
+            <a:solidFill>
+              <a:srgbClr val="FFC000"/>
+            </a:solidFill>
+          </a:ln>
+        </p:spPr>
+        <p:style>
+          <a:lnRef idx="2">
+            <a:schemeClr val="accent1">
+              <a:shade val="50000"/>
+            </a:schemeClr>
+          </a:lnRef>
+          <a:fillRef idx="1">
+            <a:schemeClr val="accent1"/>
+          </a:fillRef>
+          <a:effectRef idx="0">
+            <a:schemeClr val="accent1"/>
+          </a:effectRef>
+          <a:fontRef idx="minor">
+            <a:schemeClr val="lt1"/>
+          </a:fontRef>
+        </p:style>
+        <p:txBody>
+          <a:bodyPr rtlCol="0" anchor="ctr"/>
+          <a:lstStyle/>
+          <a:p>
+            <a:pPr algn="ctr"/>
+            <a:endParaRPr lang="en-US"/>
+          </a:p>
+        </p:txBody>
+      </p:sp>
+      <p:cxnSp>
+        <p:nvCxnSpPr>
+          <p:cNvPr id="44" name="直接连接符 43">
+            <a:extLst>
+              <a:ext uri="{FF2B5EF4-FFF2-40B4-BE49-F238E27FC236}">
+                <a16:creationId xmlns:a16="http://schemas.microsoft.com/office/drawing/2014/main" id="{43D83142-6283-4A54-B0C0-858D1AA66462}"/>
+              </a:ext>
+            </a:extLst>
+          </p:cNvPr>
+          <p:cNvCxnSpPr>
+            <a:cxnSpLocks/>
+            <a:stCxn id="43" idx="4"/>
+            <a:endCxn id="37" idx="0"/>
+          </p:cNvCxnSpPr>
+          <p:nvPr/>
+        </p:nvCxnSpPr>
+        <p:spPr>
+          <a:xfrm>
+            <a:off x="6302485" y="2491761"/>
+            <a:ext cx="12174" cy="1056344"/>
+          </a:xfrm>
+          <a:prstGeom prst="line">
+            <a:avLst/>
+          </a:prstGeom>
+          <a:ln w="15875" cap="flat" cmpd="sng" algn="ctr">
+            <a:solidFill>
+              <a:schemeClr val="accent3"/>
+            </a:solidFill>
+            <a:prstDash val="dash"/>
+            <a:round/>
+            <a:headEnd type="none" w="med" len="med"/>
+            <a:tailEnd type="none" w="med" len="med"/>
+          </a:ln>
+        </p:spPr>
+        <p:style>
+          <a:lnRef idx="0">
+            <a:scrgbClr r="0" g="0" b="0"/>
+          </a:lnRef>
+          <a:fillRef idx="0">
+            <a:scrgbClr r="0" g="0" b="0"/>
+          </a:fillRef>
+          <a:effectRef idx="0">
+            <a:scrgbClr r="0" g="0" b="0"/>
+          </a:effectRef>
+          <a:fontRef idx="minor">
+            <a:schemeClr val="tx1"/>
+          </a:fontRef>
+        </p:style>
+      </p:cxnSp>
+      <p:pic>
+        <p:nvPicPr>
+          <p:cNvPr id="47" name="图片 46">
+            <a:extLst>
+              <a:ext uri="{FF2B5EF4-FFF2-40B4-BE49-F238E27FC236}">
+                <a16:creationId xmlns:a16="http://schemas.microsoft.com/office/drawing/2014/main" id="{5763AB1C-3FA6-4B4F-8AF3-EDEE4720691B}"/>
+              </a:ext>
+            </a:extLst>
+          </p:cNvPr>
+          <p:cNvPicPr>
+            <a:picLocks noChangeAspect="1"/>
+          </p:cNvPicPr>
+          <p:nvPr/>
+        </p:nvPicPr>
+        <p:blipFill>
+          <a:blip r:embed="rId8">
+            <a:extLst>
+              <a:ext uri="{28A0092B-C50C-407E-A947-70E740481C1C}">
+                <a14:useLocalDpi xmlns:a14="http://schemas.microsoft.com/office/drawing/2010/main" val="0"/>
+              </a:ext>
+            </a:extLst>
+          </a:blip>
+          <a:stretch>
+            <a:fillRect/>
+          </a:stretch>
+        </p:blipFill>
+        <p:spPr>
+          <a:xfrm>
+            <a:off x="8663543" y="567735"/>
+            <a:ext cx="472059" cy="472059"/>
+          </a:xfrm>
+          <a:prstGeom prst="rect">
+            <a:avLst/>
+          </a:prstGeom>
+        </p:spPr>
+      </p:pic>
+      <p:pic>
+        <p:nvPicPr>
+          <p:cNvPr id="50" name="图片 49">
+            <a:extLst>
+              <a:ext uri="{FF2B5EF4-FFF2-40B4-BE49-F238E27FC236}">
+                <a16:creationId xmlns:a16="http://schemas.microsoft.com/office/drawing/2014/main" id="{828443B2-81CE-4B0E-8A32-EA816F65FE84}"/>
+              </a:ext>
+            </a:extLst>
+          </p:cNvPr>
+          <p:cNvPicPr>
+            <a:picLocks noChangeAspect="1"/>
+          </p:cNvPicPr>
+          <p:nvPr/>
+        </p:nvPicPr>
+        <p:blipFill>
+          <a:blip r:embed="rId9">
+            <a:extLst>
+              <a:ext uri="{28A0092B-C50C-407E-A947-70E740481C1C}">
+                <a14:useLocalDpi xmlns:a14="http://schemas.microsoft.com/office/drawing/2010/main" val="0"/>
+              </a:ext>
+            </a:extLst>
+          </a:blip>
+          <a:stretch>
+            <a:fillRect/>
+          </a:stretch>
+        </p:blipFill>
+        <p:spPr>
+          <a:xfrm>
+            <a:off x="10325885" y="584114"/>
+            <a:ext cx="472059" cy="472059"/>
+          </a:xfrm>
+          <a:prstGeom prst="rect">
+            <a:avLst/>
+          </a:prstGeom>
+        </p:spPr>
+      </p:pic>
+      <p:cxnSp>
+        <p:nvCxnSpPr>
+          <p:cNvPr id="9" name="直接连接符 8">
+            <a:extLst>
+              <a:ext uri="{FF2B5EF4-FFF2-40B4-BE49-F238E27FC236}">
+                <a16:creationId xmlns:a16="http://schemas.microsoft.com/office/drawing/2014/main" id="{3C72902C-F787-41E5-8A8C-85BB81AEC62D}"/>
+              </a:ext>
+            </a:extLst>
+          </p:cNvPr>
+          <p:cNvCxnSpPr/>
+          <p:nvPr/>
+        </p:nvCxnSpPr>
+        <p:spPr>
+          <a:xfrm flipH="1" flipV="1">
+            <a:off x="9365799" y="814593"/>
+            <a:ext cx="274320" cy="563880"/>
+          </a:xfrm>
+          <a:prstGeom prst="line">
+            <a:avLst/>
+          </a:prstGeom>
+          <a:ln w="15875">
+            <a:solidFill>
+              <a:srgbClr val="0091FE"/>
+            </a:solidFill>
+            <a:prstDash val="solid"/>
+          </a:ln>
+        </p:spPr>
+        <p:style>
+          <a:lnRef idx="1">
+            <a:schemeClr val="accent1"/>
+          </a:lnRef>
+          <a:fillRef idx="0">
+            <a:schemeClr val="accent1"/>
+          </a:fillRef>
+          <a:effectRef idx="0">
+            <a:schemeClr val="accent1"/>
+          </a:effectRef>
+          <a:fontRef idx="minor">
+            <a:schemeClr val="tx1"/>
+          </a:fontRef>
+        </p:style>
+      </p:cxnSp>
+      <p:cxnSp>
+        <p:nvCxnSpPr>
+          <p:cNvPr id="12" name="直接连接符 11">
+            <a:extLst>
+              <a:ext uri="{FF2B5EF4-FFF2-40B4-BE49-F238E27FC236}">
+                <a16:creationId xmlns:a16="http://schemas.microsoft.com/office/drawing/2014/main" id="{585C36EB-DC73-4F6E-B687-315FFF48AA0E}"/>
+              </a:ext>
+            </a:extLst>
+          </p:cNvPr>
+          <p:cNvCxnSpPr>
+            <a:cxnSpLocks/>
+          </p:cNvCxnSpPr>
+          <p:nvPr/>
+        </p:nvCxnSpPr>
+        <p:spPr>
+          <a:xfrm flipH="1">
+            <a:off x="9135602" y="813291"/>
+            <a:ext cx="230197" cy="0"/>
+          </a:xfrm>
+          <a:prstGeom prst="line">
+            <a:avLst/>
+          </a:prstGeom>
+          <a:ln w="15875">
+            <a:solidFill>
+              <a:srgbClr val="0091FE"/>
+            </a:solidFill>
+            <a:prstDash val="solid"/>
+          </a:ln>
+        </p:spPr>
+        <p:style>
+          <a:lnRef idx="1">
+            <a:schemeClr val="accent1"/>
+          </a:lnRef>
+          <a:fillRef idx="0">
+            <a:schemeClr val="accent1"/>
+          </a:fillRef>
+          <a:effectRef idx="0">
+            <a:schemeClr val="accent1"/>
+          </a:effectRef>
+          <a:fontRef idx="minor">
+            <a:schemeClr val="tx1"/>
+          </a:fontRef>
+        </p:style>
+      </p:cxnSp>
+      <p:cxnSp>
+        <p:nvCxnSpPr>
+          <p:cNvPr id="15" name="直接连接符 14">
+            <a:extLst>
+              <a:ext uri="{FF2B5EF4-FFF2-40B4-BE49-F238E27FC236}">
+                <a16:creationId xmlns:a16="http://schemas.microsoft.com/office/drawing/2014/main" id="{5DB38923-8CA2-4F44-8504-66D41DEC1342}"/>
+              </a:ext>
+            </a:extLst>
+          </p:cNvPr>
+          <p:cNvCxnSpPr>
+            <a:cxnSpLocks/>
+          </p:cNvCxnSpPr>
+          <p:nvPr/>
+        </p:nvCxnSpPr>
+        <p:spPr>
+          <a:xfrm flipV="1">
+            <a:off x="9792519" y="814593"/>
+            <a:ext cx="294984" cy="673135"/>
+          </a:xfrm>
+          <a:prstGeom prst="line">
+            <a:avLst/>
+          </a:prstGeom>
+          <a:ln w="15875">
+            <a:solidFill>
+              <a:srgbClr val="EE2A9F"/>
+            </a:solidFill>
+            <a:prstDash val="solid"/>
+          </a:ln>
+        </p:spPr>
+        <p:style>
+          <a:lnRef idx="1">
+            <a:schemeClr val="accent1"/>
+          </a:lnRef>
+          <a:fillRef idx="0">
+            <a:schemeClr val="accent1"/>
+          </a:fillRef>
+          <a:effectRef idx="0">
+            <a:schemeClr val="accent1"/>
+          </a:effectRef>
+          <a:fontRef idx="minor">
+            <a:schemeClr val="tx1"/>
+          </a:fontRef>
+        </p:style>
+      </p:cxnSp>
+      <p:cxnSp>
+        <p:nvCxnSpPr>
+          <p:cNvPr id="22" name="直接连接符 21">
+            <a:extLst>
+              <a:ext uri="{FF2B5EF4-FFF2-40B4-BE49-F238E27FC236}">
+                <a16:creationId xmlns:a16="http://schemas.microsoft.com/office/drawing/2014/main" id="{22B50499-EF80-4E7F-A77C-9B475FEF8980}"/>
+              </a:ext>
+            </a:extLst>
+          </p:cNvPr>
+          <p:cNvCxnSpPr>
+            <a:cxnSpLocks/>
+          </p:cNvCxnSpPr>
+          <p:nvPr/>
+        </p:nvCxnSpPr>
+        <p:spPr>
+          <a:xfrm>
+            <a:off x="10082740" y="814592"/>
+            <a:ext cx="238382" cy="5552"/>
+          </a:xfrm>
+          <a:prstGeom prst="line">
+            <a:avLst/>
+          </a:prstGeom>
+          <a:ln w="15875">
+            <a:solidFill>
+              <a:srgbClr val="EE2A9F"/>
+            </a:solidFill>
+            <a:prstDash val="solid"/>
+          </a:ln>
+        </p:spPr>
+        <p:style>
+          <a:lnRef idx="1">
+            <a:schemeClr val="accent1"/>
+          </a:lnRef>
+          <a:fillRef idx="0">
+            <a:schemeClr val="accent1"/>
+          </a:fillRef>
+          <a:effectRef idx="0">
+            <a:schemeClr val="accent1"/>
+          </a:effectRef>
+          <a:fontRef idx="minor">
+            <a:schemeClr val="tx1"/>
+          </a:fontRef>
+        </p:style>
+      </p:cxnSp>
+      <p:pic>
+        <p:nvPicPr>
+          <p:cNvPr id="49" name="图片 48">
+            <a:extLst>
+              <a:ext uri="{FF2B5EF4-FFF2-40B4-BE49-F238E27FC236}">
+                <a16:creationId xmlns:a16="http://schemas.microsoft.com/office/drawing/2014/main" id="{98E53F08-476D-4275-9E22-599F42F07F25}"/>
+              </a:ext>
+            </a:extLst>
+          </p:cNvPr>
+          <p:cNvPicPr>
+            <a:picLocks noChangeAspect="1"/>
+          </p:cNvPicPr>
+          <p:nvPr/>
+        </p:nvPicPr>
+        <p:blipFill>
+          <a:blip r:embed="rId8">
+            <a:extLst>
+              <a:ext uri="{28A0092B-C50C-407E-A947-70E740481C1C}">
+                <a14:useLocalDpi xmlns:a14="http://schemas.microsoft.com/office/drawing/2010/main" val="0"/>
+              </a:ext>
+            </a:extLst>
+          </a:blip>
+          <a:stretch>
+            <a:fillRect/>
+          </a:stretch>
+        </p:blipFill>
+        <p:spPr>
+          <a:xfrm>
+            <a:off x="7725494" y="3551262"/>
+            <a:ext cx="265176" cy="265176"/>
+          </a:xfrm>
+          <a:prstGeom prst="rect">
+            <a:avLst/>
+          </a:prstGeom>
+        </p:spPr>
+      </p:pic>
+      <p:pic>
+        <p:nvPicPr>
+          <p:cNvPr id="52" name="图片 51">
+            <a:extLst>
+              <a:ext uri="{FF2B5EF4-FFF2-40B4-BE49-F238E27FC236}">
+                <a16:creationId xmlns:a16="http://schemas.microsoft.com/office/drawing/2014/main" id="{6B40BA4B-84AA-451C-A8AD-07A32D4A2959}"/>
+              </a:ext>
+            </a:extLst>
+          </p:cNvPr>
+          <p:cNvPicPr>
+            <a:picLocks noChangeAspect="1"/>
+          </p:cNvPicPr>
+          <p:nvPr/>
+        </p:nvPicPr>
+        <p:blipFill>
+          <a:blip r:embed="rId9">
+            <a:extLst>
+              <a:ext uri="{28A0092B-C50C-407E-A947-70E740481C1C}">
+                <a14:useLocalDpi xmlns:a14="http://schemas.microsoft.com/office/drawing/2010/main" val="0"/>
+              </a:ext>
+            </a:extLst>
+          </a:blip>
+          <a:stretch>
+            <a:fillRect/>
+          </a:stretch>
+        </p:blipFill>
+        <p:spPr>
+          <a:xfrm>
+            <a:off x="7725494" y="3866044"/>
+            <a:ext cx="265176" cy="265176"/>
+          </a:xfrm>
+          <a:prstGeom prst="rect">
+            <a:avLst/>
+          </a:prstGeom>
+        </p:spPr>
+      </p:pic>
+      <p:sp>
+        <p:nvSpPr>
+          <p:cNvPr id="54" name="文本框 53">
+            <a:extLst>
+              <a:ext uri="{FF2B5EF4-FFF2-40B4-BE49-F238E27FC236}">
+                <a16:creationId xmlns:a16="http://schemas.microsoft.com/office/drawing/2014/main" id="{7F14BCE3-0E2A-43AD-ACDF-E2110F16D550}"/>
+              </a:ext>
+            </a:extLst>
+          </p:cNvPr>
+          <p:cNvSpPr txBox="1"/>
+          <p:nvPr/>
+        </p:nvSpPr>
+        <p:spPr>
+          <a:xfrm>
+            <a:off x="7952906" y="3475649"/>
+            <a:ext cx="8010353" cy="1379865"/>
+          </a:xfrm>
+          <a:prstGeom prst="rect">
+            <a:avLst/>
+          </a:prstGeom>
+          <a:noFill/>
+        </p:spPr>
+        <p:txBody>
+          <a:bodyPr wrap="square" rtlCol="0">
+            <a:spAutoFit/>
+          </a:bodyPr>
+          <a:lstStyle/>
+          <a:p>
+            <a:pPr>
+              <a:lnSpc>
+                <a:spcPts val="2500"/>
+              </a:lnSpc>
+            </a:pPr>
+            <a:r>
+              <a:rPr lang="zh-CN" altLang="en-US" sz="1600">
+                <a:solidFill>
+                  <a:schemeClr val="bg1">
+                    <a:lumMod val="50000"/>
+                  </a:schemeClr>
+                </a:solidFill>
+                <a:latin typeface="华文楷体" panose="02010600040101010101" pitchFamily="2" charset="-122"/>
+                <a:ea typeface="华文楷体" panose="02010600040101010101" pitchFamily="2" charset="-122"/>
+                <a:cs typeface="Leelawadee UI" panose="020B0502040204020203" pitchFamily="34" charset="-34"/>
+              </a:rPr>
+              <a:t>输出</a:t>
+            </a:r>
+            <a:r>
+              <a:rPr lang="en-US" altLang="zh-CN" sz="1600">
+                <a:solidFill>
+                  <a:schemeClr val="bg1">
+                    <a:lumMod val="50000"/>
+                  </a:schemeClr>
+                </a:solidFill>
+                <a:latin typeface="华文楷体" panose="02010600040101010101" pitchFamily="2" charset="-122"/>
+                <a:ea typeface="华文楷体" panose="02010600040101010101" pitchFamily="2" charset="-122"/>
+                <a:cs typeface="Leelawadee UI" panose="020B0502040204020203" pitchFamily="34" charset="-34"/>
+              </a:rPr>
+              <a:t>1</a:t>
+            </a:r>
+            <a:r>
+              <a:rPr lang="en-US" sz="1600">
+                <a:solidFill>
+                  <a:schemeClr val="bg1">
+                    <a:lumMod val="50000"/>
+                  </a:schemeClr>
+                </a:solidFill>
+                <a:latin typeface="华文楷体" panose="02010600040101010101" pitchFamily="2" charset="-122"/>
+                <a:ea typeface="华文楷体" panose="02010600040101010101" pitchFamily="2" charset="-122"/>
+                <a:cs typeface="Leelawadee UI" panose="020B0502040204020203" pitchFamily="34" charset="-34"/>
+              </a:rPr>
+              <a:t>: </a:t>
+            </a:r>
+            <a:r>
+              <a:rPr lang="zh-CN" altLang="en-US" sz="1600">
+                <a:solidFill>
+                  <a:schemeClr val="bg1">
+                    <a:lumMod val="50000"/>
+                  </a:schemeClr>
+                </a:solidFill>
+                <a:latin typeface="华文楷体" panose="02010600040101010101" pitchFamily="2" charset="-122"/>
+                <a:ea typeface="华文楷体" panose="02010600040101010101" pitchFamily="2" charset="-122"/>
+                <a:cs typeface="Leelawadee UI" panose="020B0502040204020203" pitchFamily="34" charset="-34"/>
+              </a:rPr>
+              <a:t>探测器</a:t>
+            </a:r>
+            <a:r>
+              <a:rPr lang="en-US" altLang="zh-CN" sz="1600">
+                <a:solidFill>
+                  <a:schemeClr val="bg1">
+                    <a:lumMod val="50000"/>
+                  </a:schemeClr>
+                </a:solidFill>
+                <a:latin typeface="华文楷体" panose="02010600040101010101" pitchFamily="2" charset="-122"/>
+                <a:ea typeface="华文楷体" panose="02010600040101010101" pitchFamily="2" charset="-122"/>
+                <a:cs typeface="Leelawadee UI" panose="020B0502040204020203" pitchFamily="34" charset="-34"/>
+              </a:rPr>
+              <a:t>1</a:t>
+            </a:r>
+            <a:r>
+              <a:rPr lang="zh-CN" altLang="en-US" sz="1600">
+                <a:solidFill>
+                  <a:schemeClr val="bg1">
+                    <a:lumMod val="50000"/>
+                  </a:schemeClr>
+                </a:solidFill>
+                <a:latin typeface="华文楷体" panose="02010600040101010101" pitchFamily="2" charset="-122"/>
+                <a:ea typeface="华文楷体" panose="02010600040101010101" pitchFamily="2" charset="-122"/>
+                <a:cs typeface="Leelawadee UI" panose="020B0502040204020203" pitchFamily="34" charset="-34"/>
+              </a:rPr>
+              <a:t>的输出，默认为高</a:t>
+            </a:r>
+            <a:endParaRPr lang="en-US" sz="1600">
+              <a:solidFill>
+                <a:schemeClr val="bg1">
+                  <a:lumMod val="50000"/>
+                </a:schemeClr>
+              </a:solidFill>
+              <a:latin typeface="华文楷体" panose="02010600040101010101" pitchFamily="2" charset="-122"/>
+              <a:ea typeface="华文楷体" panose="02010600040101010101" pitchFamily="2" charset="-122"/>
+              <a:cs typeface="Leelawadee UI" panose="020B0502040204020203" pitchFamily="34" charset="-34"/>
+            </a:endParaRPr>
+          </a:p>
+          <a:p>
+            <a:pPr>
+              <a:lnSpc>
+                <a:spcPts val="2500"/>
+              </a:lnSpc>
+            </a:pPr>
+            <a:r>
+              <a:rPr lang="zh-CN" altLang="en-US" sz="1600">
+                <a:solidFill>
+                  <a:schemeClr val="bg1">
+                    <a:lumMod val="50000"/>
+                  </a:schemeClr>
+                </a:solidFill>
+                <a:latin typeface="华文楷体" panose="02010600040101010101" pitchFamily="2" charset="-122"/>
+                <a:ea typeface="华文楷体" panose="02010600040101010101" pitchFamily="2" charset="-122"/>
+                <a:cs typeface="Leelawadee UI" panose="020B0502040204020203" pitchFamily="34" charset="-34"/>
+              </a:rPr>
+              <a:t>输出</a:t>
+            </a:r>
+            <a:r>
+              <a:rPr lang="en-US" altLang="zh-CN" sz="1600">
+                <a:solidFill>
+                  <a:schemeClr val="bg1">
+                    <a:lumMod val="50000"/>
+                  </a:schemeClr>
+                </a:solidFill>
+                <a:latin typeface="华文楷体" panose="02010600040101010101" pitchFamily="2" charset="-122"/>
+                <a:ea typeface="华文楷体" panose="02010600040101010101" pitchFamily="2" charset="-122"/>
+                <a:cs typeface="Leelawadee UI" panose="020B0502040204020203" pitchFamily="34" charset="-34"/>
+              </a:rPr>
+              <a:t>2</a:t>
+            </a:r>
+            <a:r>
+              <a:rPr lang="en-US" sz="1600">
+                <a:solidFill>
+                  <a:schemeClr val="bg1">
+                    <a:lumMod val="50000"/>
+                  </a:schemeClr>
+                </a:solidFill>
+                <a:latin typeface="华文楷体" panose="02010600040101010101" pitchFamily="2" charset="-122"/>
+                <a:ea typeface="华文楷体" panose="02010600040101010101" pitchFamily="2" charset="-122"/>
+                <a:cs typeface="Leelawadee UI" panose="020B0502040204020203" pitchFamily="34" charset="-34"/>
+              </a:rPr>
+              <a:t>: </a:t>
+            </a:r>
+            <a:r>
+              <a:rPr lang="zh-CN" altLang="en-US" sz="1600">
+                <a:solidFill>
+                  <a:schemeClr val="bg1">
+                    <a:lumMod val="50000"/>
+                  </a:schemeClr>
+                </a:solidFill>
+                <a:latin typeface="华文楷体" panose="02010600040101010101" pitchFamily="2" charset="-122"/>
+                <a:ea typeface="华文楷体" panose="02010600040101010101" pitchFamily="2" charset="-122"/>
+                <a:cs typeface="Leelawadee UI" panose="020B0502040204020203" pitchFamily="34" charset="-34"/>
+              </a:rPr>
+              <a:t>探测器</a:t>
+            </a:r>
+            <a:r>
+              <a:rPr lang="en-US" altLang="zh-CN" sz="1600">
+                <a:solidFill>
+                  <a:schemeClr val="bg1">
+                    <a:lumMod val="50000"/>
+                  </a:schemeClr>
+                </a:solidFill>
+                <a:latin typeface="华文楷体" panose="02010600040101010101" pitchFamily="2" charset="-122"/>
+                <a:ea typeface="华文楷体" panose="02010600040101010101" pitchFamily="2" charset="-122"/>
+                <a:cs typeface="Leelawadee UI" panose="020B0502040204020203" pitchFamily="34" charset="-34"/>
+              </a:rPr>
+              <a:t>2</a:t>
+            </a:r>
+            <a:r>
+              <a:rPr lang="zh-CN" altLang="en-US" sz="1600">
+                <a:solidFill>
+                  <a:schemeClr val="bg1">
+                    <a:lumMod val="50000"/>
+                  </a:schemeClr>
+                </a:solidFill>
+                <a:latin typeface="华文楷体" panose="02010600040101010101" pitchFamily="2" charset="-122"/>
+                <a:ea typeface="华文楷体" panose="02010600040101010101" pitchFamily="2" charset="-122"/>
+                <a:cs typeface="Leelawadee UI" panose="020B0502040204020203" pitchFamily="34" charset="-34"/>
+              </a:rPr>
+              <a:t>的输出，默认为高</a:t>
+            </a:r>
+            <a:endParaRPr lang="en-US" sz="1200">
+              <a:solidFill>
+                <a:schemeClr val="bg1">
+                  <a:lumMod val="50000"/>
+                </a:schemeClr>
+              </a:solidFill>
+              <a:latin typeface="华文楷体" panose="02010600040101010101" pitchFamily="2" charset="-122"/>
+              <a:ea typeface="华文楷体" panose="02010600040101010101" pitchFamily="2" charset="-122"/>
+            </a:endParaRPr>
+          </a:p>
+          <a:p>
+            <a:endParaRPr lang="en-US" sz="1200">
+              <a:latin typeface="Times New Roman" panose="02020603050405020304" pitchFamily="18" charset="0"/>
+              <a:cs typeface="Times New Roman" panose="02020603050405020304" pitchFamily="18" charset="0"/>
+            </a:endParaRPr>
+          </a:p>
+          <a:p>
+            <a:endParaRPr lang="en-US" sz="1200">
+              <a:latin typeface="Times New Roman" panose="02020603050405020304" pitchFamily="18" charset="0"/>
+              <a:cs typeface="Times New Roman" panose="02020603050405020304" pitchFamily="18" charset="0"/>
+            </a:endParaRPr>
+          </a:p>
+          <a:p>
+            <a:endParaRPr lang="en-US"/>
+          </a:p>
+        </p:txBody>
+      </p:sp>
+    </p:spTree>
+    <p:extLst>
+      <p:ext uri="{BB962C8B-B14F-4D97-AF65-F5344CB8AC3E}">
+        <p14:creationId xmlns:p14="http://schemas.microsoft.com/office/powerpoint/2010/main" val="3690312289"/>
+      </p:ext>
+    </p:extLst>
+  </p:cSld>
+  <p:clrMapOvr>
+    <a:masterClrMapping/>
+  </p:clrMapOvr>
+</p:sld>
+</file>
+
 <file path=ppt/theme/theme1.xml><?xml version="1.0" encoding="utf-8"?>
 <a:theme xmlns:a="http://schemas.openxmlformats.org/drawingml/2006/main" name="Office 主题​​">
   <a:themeElements>

</xml_diff>